<commit_message>
Added code segments to presentation
</commit_message>
<xml_diff>
--- a/ai_project_presentation.pptx
+++ b/ai_project_presentation.pptx
@@ -5,7 +5,7 @@
     <p:sldMasterId id="2147483840" r:id="rId1"/>
   </p:sldMasterIdLst>
   <p:notesMasterIdLst>
-    <p:notesMasterId r:id="rId12"/>
+    <p:notesMasterId r:id="rId13"/>
   </p:notesMasterIdLst>
   <p:sldIdLst>
     <p:sldId id="256" r:id="rId2"/>
@@ -14,10 +14,11 @@
     <p:sldId id="265" r:id="rId5"/>
     <p:sldId id="260" r:id="rId6"/>
     <p:sldId id="261" r:id="rId7"/>
-    <p:sldId id="262" r:id="rId8"/>
-    <p:sldId id="263" r:id="rId9"/>
-    <p:sldId id="259" r:id="rId10"/>
-    <p:sldId id="257" r:id="rId11"/>
+    <p:sldId id="267" r:id="rId8"/>
+    <p:sldId id="262" r:id="rId9"/>
+    <p:sldId id="263" r:id="rId10"/>
+    <p:sldId id="259" r:id="rId11"/>
+    <p:sldId id="257" r:id="rId12"/>
   </p:sldIdLst>
   <p:sldSz cx="12192000" cy="6858000"/>
   <p:notesSz cx="6858000" cy="9144000"/>
@@ -135,6 +136,7 @@
             <p14:sldId id="265"/>
             <p14:sldId id="260"/>
             <p14:sldId id="261"/>
+            <p14:sldId id="267"/>
             <p14:sldId id="262"/>
           </p14:sldIdLst>
         </p14:section>
@@ -6666,6 +6668,78 @@
             <a:spLocks noGrp="1"/>
           </p:cNvSpPr>
           <p:nvPr>
+            <p:ph type="ctrTitle"/>
+          </p:nvPr>
+        </p:nvSpPr>
+        <p:spPr/>
+        <p:txBody>
+          <a:bodyPr/>
+          <a:lstStyle/>
+          <a:p>
+            <a:r>
+              <a:rPr lang="en-US" dirty="0" smtClean="0"/>
+              <a:t>Any Questions?</a:t>
+            </a:r>
+            <a:endParaRPr lang="en-US" dirty="0"/>
+          </a:p>
+        </p:txBody>
+      </p:sp>
+      <p:sp>
+        <p:nvSpPr>
+          <p:cNvPr id="3" name="Subtitle 2"/>
+          <p:cNvSpPr>
+            <a:spLocks noGrp="1"/>
+          </p:cNvSpPr>
+          <p:nvPr>
+            <p:ph type="subTitle" idx="1"/>
+          </p:nvPr>
+        </p:nvSpPr>
+        <p:spPr/>
+        <p:txBody>
+          <a:bodyPr/>
+          <a:lstStyle/>
+          <a:p>
+            <a:endParaRPr lang="en-US" dirty="0"/>
+          </a:p>
+        </p:txBody>
+      </p:sp>
+    </p:spTree>
+    <p:extLst>
+      <p:ext uri="{BB962C8B-B14F-4D97-AF65-F5344CB8AC3E}">
+        <p14:creationId xmlns:p14="http://schemas.microsoft.com/office/powerpoint/2010/main" val="725231476"/>
+      </p:ext>
+    </p:extLst>
+  </p:cSld>
+  <p:clrMapOvr>
+    <a:masterClrMapping/>
+  </p:clrMapOvr>
+</p:sld>
+</file>
+
+<file path=ppt/slides/slide11.xml><?xml version="1.0" encoding="utf-8"?>
+<p:sld xmlns:a="http://schemas.openxmlformats.org/drawingml/2006/main" xmlns:r="http://schemas.openxmlformats.org/officeDocument/2006/relationships" xmlns:p="http://schemas.openxmlformats.org/presentationml/2006/main">
+  <p:cSld>
+    <p:spTree>
+      <p:nvGrpSpPr>
+        <p:cNvPr id="1" name=""/>
+        <p:cNvGrpSpPr/>
+        <p:nvPr/>
+      </p:nvGrpSpPr>
+      <p:grpSpPr>
+        <a:xfrm>
+          <a:off x="0" y="0"/>
+          <a:ext cx="0" cy="0"/>
+          <a:chOff x="0" y="0"/>
+          <a:chExt cx="0" cy="0"/>
+        </a:xfrm>
+      </p:grpSpPr>
+      <p:sp>
+        <p:nvSpPr>
+          <p:cNvPr id="2" name="Title 1"/>
+          <p:cNvSpPr>
+            <a:spLocks noGrp="1"/>
+          </p:cNvSpPr>
+          <p:nvPr>
             <p:ph type="title"/>
           </p:nvPr>
         </p:nvSpPr>
@@ -8459,25 +8533,36 @@
           </a:p>
         </p:txBody>
       </p:sp>
-      <p:sp>
-        <p:nvSpPr>
-          <p:cNvPr id="3" name="Content Placeholder 2"/>
-          <p:cNvSpPr>
-            <a:spLocks noGrp="1"/>
-          </p:cNvSpPr>
-          <p:nvPr>
-            <p:ph idx="1"/>
-          </p:nvPr>
-        </p:nvSpPr>
-        <p:spPr/>
-        <p:txBody>
-          <a:bodyPr/>
-          <a:lstStyle/>
-          <a:p>
-            <a:endParaRPr lang="en-US" dirty="0"/>
-          </a:p>
-        </p:txBody>
-      </p:sp>
+      <p:pic>
+        <p:nvPicPr>
+          <p:cNvPr id="5" name="Picture 4"/>
+          <p:cNvPicPr>
+            <a:picLocks noChangeAspect="1"/>
+          </p:cNvPicPr>
+          <p:nvPr/>
+        </p:nvPicPr>
+        <p:blipFill>
+          <a:blip r:embed="rId2">
+            <a:extLst>
+              <a:ext uri="{28A0092B-C50C-407E-A947-70E740481C1C}">
+                <a14:useLocalDpi xmlns:a14="http://schemas.microsoft.com/office/drawing/2010/main" val="0"/>
+              </a:ext>
+            </a:extLst>
+          </a:blip>
+          <a:stretch>
+            <a:fillRect/>
+          </a:stretch>
+        </p:blipFill>
+        <p:spPr>
+          <a:xfrm>
+            <a:off x="913795" y="2245050"/>
+            <a:ext cx="10452100" cy="2882900"/>
+          </a:xfrm>
+          <a:prstGeom prst="rect">
+            <a:avLst/>
+          </a:prstGeom>
+        </p:spPr>
+      </p:pic>
     </p:spTree>
     <p:extLst>
       <p:ext uri="{BB962C8B-B14F-4D97-AF65-F5344CB8AC3E}">
@@ -8525,35 +8610,45 @@
           <a:p>
             <a:r>
               <a:rPr lang="en-US" dirty="0" smtClean="0"/>
-              <a:t>Neural Networks</a:t>
-            </a:r>
-            <a:endParaRPr lang="en-US" dirty="0"/>
-          </a:p>
-        </p:txBody>
-      </p:sp>
-      <p:sp>
-        <p:nvSpPr>
-          <p:cNvPr id="3" name="Content Placeholder 2"/>
-          <p:cNvSpPr>
-            <a:spLocks noGrp="1"/>
-          </p:cNvSpPr>
+              <a:t>Feature Extraction</a:t>
+            </a:r>
+            <a:endParaRPr lang="en-US" dirty="0"/>
+          </a:p>
+        </p:txBody>
+      </p:sp>
+      <p:pic>
+        <p:nvPicPr>
+          <p:cNvPr id="4" name="Content Placeholder 3"/>
+          <p:cNvPicPr>
+            <a:picLocks noGrp="1" noChangeAspect="1"/>
+          </p:cNvPicPr>
           <p:nvPr>
             <p:ph idx="1"/>
           </p:nvPr>
-        </p:nvSpPr>
-        <p:spPr/>
-        <p:txBody>
-          <a:bodyPr/>
-          <a:lstStyle/>
-          <a:p>
-            <a:endParaRPr lang="en-US" dirty="0"/>
-          </a:p>
-        </p:txBody>
-      </p:sp>
+        </p:nvPicPr>
+        <p:blipFill>
+          <a:blip r:embed="rId2">
+            <a:extLst>
+              <a:ext uri="{28A0092B-C50C-407E-A947-70E740481C1C}">
+                <a14:useLocalDpi xmlns:a14="http://schemas.microsoft.com/office/drawing/2010/main" val="0"/>
+              </a:ext>
+            </a:extLst>
+          </a:blip>
+          <a:stretch>
+            <a:fillRect/>
+          </a:stretch>
+        </p:blipFill>
+        <p:spPr>
+          <a:xfrm>
+            <a:off x="1154382" y="2118050"/>
+            <a:ext cx="9872587" cy="3406450"/>
+          </a:xfrm>
+        </p:spPr>
+      </p:pic>
     </p:spTree>
     <p:extLst>
       <p:ext uri="{BB962C8B-B14F-4D97-AF65-F5344CB8AC3E}">
-        <p14:creationId xmlns:p14="http://schemas.microsoft.com/office/powerpoint/2010/main" val="297738534"/>
+        <p14:creationId xmlns:p14="http://schemas.microsoft.com/office/powerpoint/2010/main" val="1679131705"/>
       </p:ext>
     </p:extLst>
   </p:cSld>
@@ -8597,7 +8692,7 @@
           <a:p>
             <a:r>
               <a:rPr lang="en-US" dirty="0" smtClean="0"/>
-              <a:t>Results</a:t>
+              <a:t>Neural Networks</a:t>
             </a:r>
             <a:endParaRPr lang="en-US" dirty="0"/>
           </a:p>
@@ -8618,10 +8713,6 @@
           <a:bodyPr/>
           <a:lstStyle/>
           <a:p>
-            <a:r>
-              <a:rPr lang="en-US" dirty="0" smtClean="0"/>
-              <a:t>Include table from paper maybe?</a:t>
-            </a:r>
             <a:endParaRPr lang="en-US" dirty="0"/>
           </a:p>
         </p:txBody>
@@ -8629,7 +8720,7 @@
     </p:spTree>
     <p:extLst>
       <p:ext uri="{BB962C8B-B14F-4D97-AF65-F5344CB8AC3E}">
-        <p14:creationId xmlns:p14="http://schemas.microsoft.com/office/powerpoint/2010/main" val="1240131665"/>
+        <p14:creationId xmlns:p14="http://schemas.microsoft.com/office/powerpoint/2010/main" val="297738534"/>
       </p:ext>
     </p:extLst>
   </p:cSld>
@@ -8663,7 +8754,7 @@
             <a:spLocks noGrp="1"/>
           </p:cNvSpPr>
           <p:nvPr>
-            <p:ph type="ctrTitle"/>
+            <p:ph type="title"/>
           </p:nvPr>
         </p:nvSpPr>
         <p:spPr/>
@@ -8673,20 +8764,20 @@
           <a:p>
             <a:r>
               <a:rPr lang="en-US" dirty="0" smtClean="0"/>
-              <a:t>Any Questions?</a:t>
-            </a:r>
-            <a:endParaRPr lang="en-US" dirty="0"/>
-          </a:p>
-        </p:txBody>
-      </p:sp>
-      <p:sp>
-        <p:nvSpPr>
-          <p:cNvPr id="3" name="Subtitle 2"/>
-          <p:cNvSpPr>
-            <a:spLocks noGrp="1"/>
-          </p:cNvSpPr>
-          <p:nvPr>
-            <p:ph type="subTitle" idx="1"/>
+              <a:t>Results</a:t>
+            </a:r>
+            <a:endParaRPr lang="en-US" dirty="0"/>
+          </a:p>
+        </p:txBody>
+      </p:sp>
+      <p:sp>
+        <p:nvSpPr>
+          <p:cNvPr id="3" name="Content Placeholder 2"/>
+          <p:cNvSpPr>
+            <a:spLocks noGrp="1"/>
+          </p:cNvSpPr>
+          <p:nvPr>
+            <p:ph idx="1"/>
           </p:nvPr>
         </p:nvSpPr>
         <p:spPr/>
@@ -8694,6 +8785,10 @@
           <a:bodyPr/>
           <a:lstStyle/>
           <a:p>
+            <a:r>
+              <a:rPr lang="en-US" dirty="0" smtClean="0"/>
+              <a:t>Include table from paper maybe?</a:t>
+            </a:r>
             <a:endParaRPr lang="en-US" dirty="0"/>
           </a:p>
         </p:txBody>
@@ -8701,7 +8796,7 @@
     </p:spTree>
     <p:extLst>
       <p:ext uri="{BB962C8B-B14F-4D97-AF65-F5344CB8AC3E}">
-        <p14:creationId xmlns:p14="http://schemas.microsoft.com/office/powerpoint/2010/main" val="725231476"/>
+        <p14:creationId xmlns:p14="http://schemas.microsoft.com/office/powerpoint/2010/main" val="1240131665"/>
       </p:ext>
     </p:extLst>
   </p:cSld>

</xml_diff>

<commit_message>
added questions for final exam
</commit_message>
<xml_diff>
--- a/ai_project_presentation.pptx
+++ b/ai_project_presentation.pptx
@@ -256,7 +256,7 @@
           <a:p>
             <a:fld id="{0887EE72-4D28-B64D-B4B9-0C77F6B66733}" type="datetimeFigureOut">
               <a:rPr lang="en-US" smtClean="0"/>
-              <a:t>4/24/16</a:t>
+              <a:t>4/25/16</a:t>
             </a:fld>
             <a:endParaRPr lang="en-US"/>
           </a:p>
@@ -634,6 +634,19 @@
               <a:rPr lang="en-US" dirty="0" err="1" smtClean="0"/>
               <a:t>authorattributionsite</a:t>
             </a:r>
+            <a:endParaRPr lang="en-US" dirty="0" smtClean="0"/>
+          </a:p>
+          <a:p>
+            <a:endParaRPr lang="en-US" dirty="0" smtClean="0"/>
+          </a:p>
+          <a:p>
+            <a:endParaRPr lang="en-US" dirty="0" smtClean="0"/>
+          </a:p>
+          <a:p>
+            <a:r>
+              <a:rPr lang="en-US" dirty="0" smtClean="0"/>
+              <a:t>Brady here</a:t>
+            </a:r>
             <a:endParaRPr lang="en-US" dirty="0"/>
           </a:p>
         </p:txBody>
@@ -665,6 +678,182 @@
     <p:extLst>
       <p:ext uri="{BB962C8B-B14F-4D97-AF65-F5344CB8AC3E}">
         <p14:creationId xmlns:p14="http://schemas.microsoft.com/office/powerpoint/2010/main" val="1120859546"/>
+      </p:ext>
+    </p:extLst>
+  </p:cSld>
+  <p:clrMapOvr>
+    <a:masterClrMapping/>
+  </p:clrMapOvr>
+</p:notes>
+</file>
+
+<file path=ppt/notesSlides/notesSlide10.xml><?xml version="1.0" encoding="utf-8"?>
+<p:notes xmlns:a="http://schemas.openxmlformats.org/drawingml/2006/main" xmlns:r="http://schemas.openxmlformats.org/officeDocument/2006/relationships" xmlns:p="http://schemas.openxmlformats.org/presentationml/2006/main">
+  <p:cSld>
+    <p:spTree>
+      <p:nvGrpSpPr>
+        <p:cNvPr id="1" name=""/>
+        <p:cNvGrpSpPr/>
+        <p:nvPr/>
+      </p:nvGrpSpPr>
+      <p:grpSpPr>
+        <a:xfrm>
+          <a:off x="0" y="0"/>
+          <a:ext cx="0" cy="0"/>
+          <a:chOff x="0" y="0"/>
+          <a:chExt cx="0" cy="0"/>
+        </a:xfrm>
+      </p:grpSpPr>
+      <p:sp>
+        <p:nvSpPr>
+          <p:cNvPr id="2" name="Slide Image Placeholder 1"/>
+          <p:cNvSpPr>
+            <a:spLocks noGrp="1" noRot="1" noChangeAspect="1"/>
+          </p:cNvSpPr>
+          <p:nvPr>
+            <p:ph type="sldImg"/>
+          </p:nvPr>
+        </p:nvSpPr>
+        <p:spPr/>
+      </p:sp>
+      <p:sp>
+        <p:nvSpPr>
+          <p:cNvPr id="3" name="Notes Placeholder 2"/>
+          <p:cNvSpPr>
+            <a:spLocks noGrp="1"/>
+          </p:cNvSpPr>
+          <p:nvPr>
+            <p:ph type="body" idx="1"/>
+          </p:nvPr>
+        </p:nvSpPr>
+        <p:spPr/>
+        <p:txBody>
+          <a:bodyPr/>
+          <a:lstStyle/>
+          <a:p>
+            <a:r>
+              <a:rPr lang="en-US" dirty="0" smtClean="0"/>
+              <a:t>matt</a:t>
+            </a:r>
+            <a:endParaRPr lang="en-US" dirty="0"/>
+          </a:p>
+        </p:txBody>
+      </p:sp>
+      <p:sp>
+        <p:nvSpPr>
+          <p:cNvPr id="4" name="Slide Number Placeholder 3"/>
+          <p:cNvSpPr>
+            <a:spLocks noGrp="1"/>
+          </p:cNvSpPr>
+          <p:nvPr>
+            <p:ph type="sldNum" sz="quarter" idx="10"/>
+          </p:nvPr>
+        </p:nvSpPr>
+        <p:spPr/>
+        <p:txBody>
+          <a:bodyPr/>
+          <a:lstStyle/>
+          <a:p>
+            <a:fld id="{53D707A1-1B9C-9244-B89C-5F515C41BB18}" type="slidenum">
+              <a:rPr lang="en-US" smtClean="0"/>
+              <a:t>15</a:t>
+            </a:fld>
+            <a:endParaRPr lang="en-US"/>
+          </a:p>
+        </p:txBody>
+      </p:sp>
+    </p:spTree>
+    <p:extLst>
+      <p:ext uri="{BB962C8B-B14F-4D97-AF65-F5344CB8AC3E}">
+        <p14:creationId xmlns:p14="http://schemas.microsoft.com/office/powerpoint/2010/main" val="1637314389"/>
+      </p:ext>
+    </p:extLst>
+  </p:cSld>
+  <p:clrMapOvr>
+    <a:masterClrMapping/>
+  </p:clrMapOvr>
+</p:notes>
+</file>
+
+<file path=ppt/notesSlides/notesSlide11.xml><?xml version="1.0" encoding="utf-8"?>
+<p:notes xmlns:a="http://schemas.openxmlformats.org/drawingml/2006/main" xmlns:r="http://schemas.openxmlformats.org/officeDocument/2006/relationships" xmlns:p="http://schemas.openxmlformats.org/presentationml/2006/main">
+  <p:cSld>
+    <p:spTree>
+      <p:nvGrpSpPr>
+        <p:cNvPr id="1" name=""/>
+        <p:cNvGrpSpPr/>
+        <p:nvPr/>
+      </p:nvGrpSpPr>
+      <p:grpSpPr>
+        <a:xfrm>
+          <a:off x="0" y="0"/>
+          <a:ext cx="0" cy="0"/>
+          <a:chOff x="0" y="0"/>
+          <a:chExt cx="0" cy="0"/>
+        </a:xfrm>
+      </p:grpSpPr>
+      <p:sp>
+        <p:nvSpPr>
+          <p:cNvPr id="2" name="Slide Image Placeholder 1"/>
+          <p:cNvSpPr>
+            <a:spLocks noGrp="1" noRot="1" noChangeAspect="1"/>
+          </p:cNvSpPr>
+          <p:nvPr>
+            <p:ph type="sldImg"/>
+          </p:nvPr>
+        </p:nvSpPr>
+        <p:spPr/>
+      </p:sp>
+      <p:sp>
+        <p:nvSpPr>
+          <p:cNvPr id="3" name="Notes Placeholder 2"/>
+          <p:cNvSpPr>
+            <a:spLocks noGrp="1"/>
+          </p:cNvSpPr>
+          <p:nvPr>
+            <p:ph type="body" idx="1"/>
+          </p:nvPr>
+        </p:nvSpPr>
+        <p:spPr/>
+        <p:txBody>
+          <a:bodyPr/>
+          <a:lstStyle/>
+          <a:p>
+            <a:r>
+              <a:rPr lang="en-US" dirty="0" smtClean="0"/>
+              <a:t>me</a:t>
+            </a:r>
+            <a:endParaRPr lang="en-US" dirty="0"/>
+          </a:p>
+        </p:txBody>
+      </p:sp>
+      <p:sp>
+        <p:nvSpPr>
+          <p:cNvPr id="4" name="Slide Number Placeholder 3"/>
+          <p:cNvSpPr>
+            <a:spLocks noGrp="1"/>
+          </p:cNvSpPr>
+          <p:nvPr>
+            <p:ph type="sldNum" sz="quarter" idx="10"/>
+          </p:nvPr>
+        </p:nvSpPr>
+        <p:spPr/>
+        <p:txBody>
+          <a:bodyPr/>
+          <a:lstStyle/>
+          <a:p>
+            <a:fld id="{53D707A1-1B9C-9244-B89C-5F515C41BB18}" type="slidenum">
+              <a:rPr lang="en-US" smtClean="0"/>
+              <a:t>16</a:t>
+            </a:fld>
+            <a:endParaRPr lang="en-US"/>
+          </a:p>
+        </p:txBody>
+      </p:sp>
+    </p:spTree>
+    <p:extLst>
+      <p:ext uri="{BB962C8B-B14F-4D97-AF65-F5344CB8AC3E}">
+        <p14:creationId xmlns:p14="http://schemas.microsoft.com/office/powerpoint/2010/main" val="487483265"/>
       </p:ext>
     </p:extLst>
   </p:cSld>
@@ -718,6 +907,14 @@
           <a:bodyPr/>
           <a:lstStyle/>
           <a:p>
+            <a:r>
+              <a:rPr lang="en-US" dirty="0" smtClean="0"/>
+              <a:t>Matt</a:t>
+            </a:r>
+            <a:r>
+              <a:rPr lang="en-US" baseline="0" dirty="0" smtClean="0"/>
+              <a:t> here</a:t>
+            </a:r>
             <a:endParaRPr lang="en-US" dirty="0"/>
           </a:p>
         </p:txBody>
@@ -749,6 +946,622 @@
     <p:extLst>
       <p:ext uri="{BB962C8B-B14F-4D97-AF65-F5344CB8AC3E}">
         <p14:creationId xmlns:p14="http://schemas.microsoft.com/office/powerpoint/2010/main" val="1592722310"/>
+      </p:ext>
+    </p:extLst>
+  </p:cSld>
+  <p:clrMapOvr>
+    <a:masterClrMapping/>
+  </p:clrMapOvr>
+</p:notes>
+</file>
+
+<file path=ppt/notesSlides/notesSlide3.xml><?xml version="1.0" encoding="utf-8"?>
+<p:notes xmlns:a="http://schemas.openxmlformats.org/drawingml/2006/main" xmlns:r="http://schemas.openxmlformats.org/officeDocument/2006/relationships" xmlns:p="http://schemas.openxmlformats.org/presentationml/2006/main">
+  <p:cSld>
+    <p:spTree>
+      <p:nvGrpSpPr>
+        <p:cNvPr id="1" name=""/>
+        <p:cNvGrpSpPr/>
+        <p:nvPr/>
+      </p:nvGrpSpPr>
+      <p:grpSpPr>
+        <a:xfrm>
+          <a:off x="0" y="0"/>
+          <a:ext cx="0" cy="0"/>
+          <a:chOff x="0" y="0"/>
+          <a:chExt cx="0" cy="0"/>
+        </a:xfrm>
+      </p:grpSpPr>
+      <p:sp>
+        <p:nvSpPr>
+          <p:cNvPr id="2" name="Slide Image Placeholder 1"/>
+          <p:cNvSpPr>
+            <a:spLocks noGrp="1" noRot="1" noChangeAspect="1"/>
+          </p:cNvSpPr>
+          <p:nvPr>
+            <p:ph type="sldImg"/>
+          </p:nvPr>
+        </p:nvSpPr>
+        <p:spPr/>
+      </p:sp>
+      <p:sp>
+        <p:nvSpPr>
+          <p:cNvPr id="3" name="Notes Placeholder 2"/>
+          <p:cNvSpPr>
+            <a:spLocks noGrp="1"/>
+          </p:cNvSpPr>
+          <p:nvPr>
+            <p:ph type="body" idx="1"/>
+          </p:nvPr>
+        </p:nvSpPr>
+        <p:spPr/>
+        <p:txBody>
+          <a:bodyPr/>
+          <a:lstStyle/>
+          <a:p>
+            <a:r>
+              <a:rPr lang="en-US" dirty="0" err="1" smtClean="0"/>
+              <a:t>brady</a:t>
+            </a:r>
+            <a:endParaRPr lang="en-US" dirty="0"/>
+          </a:p>
+        </p:txBody>
+      </p:sp>
+      <p:sp>
+        <p:nvSpPr>
+          <p:cNvPr id="4" name="Slide Number Placeholder 3"/>
+          <p:cNvSpPr>
+            <a:spLocks noGrp="1"/>
+          </p:cNvSpPr>
+          <p:nvPr>
+            <p:ph type="sldNum" sz="quarter" idx="10"/>
+          </p:nvPr>
+        </p:nvSpPr>
+        <p:spPr/>
+        <p:txBody>
+          <a:bodyPr/>
+          <a:lstStyle/>
+          <a:p>
+            <a:fld id="{53D707A1-1B9C-9244-B89C-5F515C41BB18}" type="slidenum">
+              <a:rPr lang="en-US" smtClean="0"/>
+              <a:t>8</a:t>
+            </a:fld>
+            <a:endParaRPr lang="en-US"/>
+          </a:p>
+        </p:txBody>
+      </p:sp>
+    </p:spTree>
+    <p:extLst>
+      <p:ext uri="{BB962C8B-B14F-4D97-AF65-F5344CB8AC3E}">
+        <p14:creationId xmlns:p14="http://schemas.microsoft.com/office/powerpoint/2010/main" val="2070268590"/>
+      </p:ext>
+    </p:extLst>
+  </p:cSld>
+  <p:clrMapOvr>
+    <a:masterClrMapping/>
+  </p:clrMapOvr>
+</p:notes>
+</file>
+
+<file path=ppt/notesSlides/notesSlide4.xml><?xml version="1.0" encoding="utf-8"?>
+<p:notes xmlns:a="http://schemas.openxmlformats.org/drawingml/2006/main" xmlns:r="http://schemas.openxmlformats.org/officeDocument/2006/relationships" xmlns:p="http://schemas.openxmlformats.org/presentationml/2006/main">
+  <p:cSld>
+    <p:spTree>
+      <p:nvGrpSpPr>
+        <p:cNvPr id="1" name=""/>
+        <p:cNvGrpSpPr/>
+        <p:nvPr/>
+      </p:nvGrpSpPr>
+      <p:grpSpPr>
+        <a:xfrm>
+          <a:off x="0" y="0"/>
+          <a:ext cx="0" cy="0"/>
+          <a:chOff x="0" y="0"/>
+          <a:chExt cx="0" cy="0"/>
+        </a:xfrm>
+      </p:grpSpPr>
+      <p:sp>
+        <p:nvSpPr>
+          <p:cNvPr id="2" name="Slide Image Placeholder 1"/>
+          <p:cNvSpPr>
+            <a:spLocks noGrp="1" noRot="1" noChangeAspect="1"/>
+          </p:cNvSpPr>
+          <p:nvPr>
+            <p:ph type="sldImg"/>
+          </p:nvPr>
+        </p:nvSpPr>
+        <p:spPr/>
+      </p:sp>
+      <p:sp>
+        <p:nvSpPr>
+          <p:cNvPr id="3" name="Notes Placeholder 2"/>
+          <p:cNvSpPr>
+            <a:spLocks noGrp="1"/>
+          </p:cNvSpPr>
+          <p:nvPr>
+            <p:ph type="body" idx="1"/>
+          </p:nvPr>
+        </p:nvSpPr>
+        <p:spPr/>
+        <p:txBody>
+          <a:bodyPr/>
+          <a:lstStyle/>
+          <a:p>
+            <a:r>
+              <a:rPr lang="en-US" dirty="0" smtClean="0"/>
+              <a:t>matt</a:t>
+            </a:r>
+            <a:endParaRPr lang="en-US" dirty="0"/>
+          </a:p>
+        </p:txBody>
+      </p:sp>
+      <p:sp>
+        <p:nvSpPr>
+          <p:cNvPr id="4" name="Slide Number Placeholder 3"/>
+          <p:cNvSpPr>
+            <a:spLocks noGrp="1"/>
+          </p:cNvSpPr>
+          <p:nvPr>
+            <p:ph type="sldNum" sz="quarter" idx="10"/>
+          </p:nvPr>
+        </p:nvSpPr>
+        <p:spPr/>
+        <p:txBody>
+          <a:bodyPr/>
+          <a:lstStyle/>
+          <a:p>
+            <a:fld id="{53D707A1-1B9C-9244-B89C-5F515C41BB18}" type="slidenum">
+              <a:rPr lang="en-US" smtClean="0"/>
+              <a:t>9</a:t>
+            </a:fld>
+            <a:endParaRPr lang="en-US"/>
+          </a:p>
+        </p:txBody>
+      </p:sp>
+    </p:spTree>
+    <p:extLst>
+      <p:ext uri="{BB962C8B-B14F-4D97-AF65-F5344CB8AC3E}">
+        <p14:creationId xmlns:p14="http://schemas.microsoft.com/office/powerpoint/2010/main" val="1474143436"/>
+      </p:ext>
+    </p:extLst>
+  </p:cSld>
+  <p:clrMapOvr>
+    <a:masterClrMapping/>
+  </p:clrMapOvr>
+</p:notes>
+</file>
+
+<file path=ppt/notesSlides/notesSlide5.xml><?xml version="1.0" encoding="utf-8"?>
+<p:notes xmlns:a="http://schemas.openxmlformats.org/drawingml/2006/main" xmlns:r="http://schemas.openxmlformats.org/officeDocument/2006/relationships" xmlns:p="http://schemas.openxmlformats.org/presentationml/2006/main">
+  <p:cSld>
+    <p:spTree>
+      <p:nvGrpSpPr>
+        <p:cNvPr id="1" name=""/>
+        <p:cNvGrpSpPr/>
+        <p:nvPr/>
+      </p:nvGrpSpPr>
+      <p:grpSpPr>
+        <a:xfrm>
+          <a:off x="0" y="0"/>
+          <a:ext cx="0" cy="0"/>
+          <a:chOff x="0" y="0"/>
+          <a:chExt cx="0" cy="0"/>
+        </a:xfrm>
+      </p:grpSpPr>
+      <p:sp>
+        <p:nvSpPr>
+          <p:cNvPr id="2" name="Slide Image Placeholder 1"/>
+          <p:cNvSpPr>
+            <a:spLocks noGrp="1" noRot="1" noChangeAspect="1"/>
+          </p:cNvSpPr>
+          <p:nvPr>
+            <p:ph type="sldImg"/>
+          </p:nvPr>
+        </p:nvSpPr>
+        <p:spPr/>
+      </p:sp>
+      <p:sp>
+        <p:nvSpPr>
+          <p:cNvPr id="3" name="Notes Placeholder 2"/>
+          <p:cNvSpPr>
+            <a:spLocks noGrp="1"/>
+          </p:cNvSpPr>
+          <p:nvPr>
+            <p:ph type="body" idx="1"/>
+          </p:nvPr>
+        </p:nvSpPr>
+        <p:spPr/>
+        <p:txBody>
+          <a:bodyPr/>
+          <a:lstStyle/>
+          <a:p>
+            <a:r>
+              <a:rPr lang="en-US" dirty="0" smtClean="0"/>
+              <a:t>me</a:t>
+            </a:r>
+            <a:endParaRPr lang="en-US" dirty="0"/>
+          </a:p>
+        </p:txBody>
+      </p:sp>
+      <p:sp>
+        <p:nvSpPr>
+          <p:cNvPr id="4" name="Slide Number Placeholder 3"/>
+          <p:cNvSpPr>
+            <a:spLocks noGrp="1"/>
+          </p:cNvSpPr>
+          <p:nvPr>
+            <p:ph type="sldNum" sz="quarter" idx="10"/>
+          </p:nvPr>
+        </p:nvSpPr>
+        <p:spPr/>
+        <p:txBody>
+          <a:bodyPr/>
+          <a:lstStyle/>
+          <a:p>
+            <a:fld id="{53D707A1-1B9C-9244-B89C-5F515C41BB18}" type="slidenum">
+              <a:rPr lang="en-US" smtClean="0"/>
+              <a:t>10</a:t>
+            </a:fld>
+            <a:endParaRPr lang="en-US"/>
+          </a:p>
+        </p:txBody>
+      </p:sp>
+    </p:spTree>
+    <p:extLst>
+      <p:ext uri="{BB962C8B-B14F-4D97-AF65-F5344CB8AC3E}">
+        <p14:creationId xmlns:p14="http://schemas.microsoft.com/office/powerpoint/2010/main" val="409893413"/>
+      </p:ext>
+    </p:extLst>
+  </p:cSld>
+  <p:clrMapOvr>
+    <a:masterClrMapping/>
+  </p:clrMapOvr>
+</p:notes>
+</file>
+
+<file path=ppt/notesSlides/notesSlide6.xml><?xml version="1.0" encoding="utf-8"?>
+<p:notes xmlns:a="http://schemas.openxmlformats.org/drawingml/2006/main" xmlns:r="http://schemas.openxmlformats.org/officeDocument/2006/relationships" xmlns:p="http://schemas.openxmlformats.org/presentationml/2006/main">
+  <p:cSld>
+    <p:spTree>
+      <p:nvGrpSpPr>
+        <p:cNvPr id="1" name=""/>
+        <p:cNvGrpSpPr/>
+        <p:nvPr/>
+      </p:nvGrpSpPr>
+      <p:grpSpPr>
+        <a:xfrm>
+          <a:off x="0" y="0"/>
+          <a:ext cx="0" cy="0"/>
+          <a:chOff x="0" y="0"/>
+          <a:chExt cx="0" cy="0"/>
+        </a:xfrm>
+      </p:grpSpPr>
+      <p:sp>
+        <p:nvSpPr>
+          <p:cNvPr id="2" name="Slide Image Placeholder 1"/>
+          <p:cNvSpPr>
+            <a:spLocks noGrp="1" noRot="1" noChangeAspect="1"/>
+          </p:cNvSpPr>
+          <p:nvPr>
+            <p:ph type="sldImg"/>
+          </p:nvPr>
+        </p:nvSpPr>
+        <p:spPr/>
+      </p:sp>
+      <p:sp>
+        <p:nvSpPr>
+          <p:cNvPr id="3" name="Notes Placeholder 2"/>
+          <p:cNvSpPr>
+            <a:spLocks noGrp="1"/>
+          </p:cNvSpPr>
+          <p:nvPr>
+            <p:ph type="body" idx="1"/>
+          </p:nvPr>
+        </p:nvSpPr>
+        <p:spPr/>
+        <p:txBody>
+          <a:bodyPr/>
+          <a:lstStyle/>
+          <a:p>
+            <a:r>
+              <a:rPr lang="en-US" dirty="0" smtClean="0"/>
+              <a:t>matt</a:t>
+            </a:r>
+            <a:endParaRPr lang="en-US" dirty="0"/>
+          </a:p>
+        </p:txBody>
+      </p:sp>
+      <p:sp>
+        <p:nvSpPr>
+          <p:cNvPr id="4" name="Slide Number Placeholder 3"/>
+          <p:cNvSpPr>
+            <a:spLocks noGrp="1"/>
+          </p:cNvSpPr>
+          <p:nvPr>
+            <p:ph type="sldNum" sz="quarter" idx="10"/>
+          </p:nvPr>
+        </p:nvSpPr>
+        <p:spPr/>
+        <p:txBody>
+          <a:bodyPr/>
+          <a:lstStyle/>
+          <a:p>
+            <a:fld id="{53D707A1-1B9C-9244-B89C-5F515C41BB18}" type="slidenum">
+              <a:rPr lang="en-US" smtClean="0"/>
+              <a:t>11</a:t>
+            </a:fld>
+            <a:endParaRPr lang="en-US"/>
+          </a:p>
+        </p:txBody>
+      </p:sp>
+    </p:spTree>
+    <p:extLst>
+      <p:ext uri="{BB962C8B-B14F-4D97-AF65-F5344CB8AC3E}">
+        <p14:creationId xmlns:p14="http://schemas.microsoft.com/office/powerpoint/2010/main" val="2098536362"/>
+      </p:ext>
+    </p:extLst>
+  </p:cSld>
+  <p:clrMapOvr>
+    <a:masterClrMapping/>
+  </p:clrMapOvr>
+</p:notes>
+</file>
+
+<file path=ppt/notesSlides/notesSlide7.xml><?xml version="1.0" encoding="utf-8"?>
+<p:notes xmlns:a="http://schemas.openxmlformats.org/drawingml/2006/main" xmlns:r="http://schemas.openxmlformats.org/officeDocument/2006/relationships" xmlns:p="http://schemas.openxmlformats.org/presentationml/2006/main">
+  <p:cSld>
+    <p:spTree>
+      <p:nvGrpSpPr>
+        <p:cNvPr id="1" name=""/>
+        <p:cNvGrpSpPr/>
+        <p:nvPr/>
+      </p:nvGrpSpPr>
+      <p:grpSpPr>
+        <a:xfrm>
+          <a:off x="0" y="0"/>
+          <a:ext cx="0" cy="0"/>
+          <a:chOff x="0" y="0"/>
+          <a:chExt cx="0" cy="0"/>
+        </a:xfrm>
+      </p:grpSpPr>
+      <p:sp>
+        <p:nvSpPr>
+          <p:cNvPr id="2" name="Slide Image Placeholder 1"/>
+          <p:cNvSpPr>
+            <a:spLocks noGrp="1" noRot="1" noChangeAspect="1"/>
+          </p:cNvSpPr>
+          <p:nvPr>
+            <p:ph type="sldImg"/>
+          </p:nvPr>
+        </p:nvSpPr>
+        <p:spPr/>
+      </p:sp>
+      <p:sp>
+        <p:nvSpPr>
+          <p:cNvPr id="3" name="Notes Placeholder 2"/>
+          <p:cNvSpPr>
+            <a:spLocks noGrp="1"/>
+          </p:cNvSpPr>
+          <p:nvPr>
+            <p:ph type="body" idx="1"/>
+          </p:nvPr>
+        </p:nvSpPr>
+        <p:spPr/>
+        <p:txBody>
+          <a:bodyPr/>
+          <a:lstStyle/>
+          <a:p>
+            <a:r>
+              <a:rPr lang="en-US" dirty="0" smtClean="0"/>
+              <a:t>me</a:t>
+            </a:r>
+            <a:endParaRPr lang="en-US" dirty="0"/>
+          </a:p>
+        </p:txBody>
+      </p:sp>
+      <p:sp>
+        <p:nvSpPr>
+          <p:cNvPr id="4" name="Slide Number Placeholder 3"/>
+          <p:cNvSpPr>
+            <a:spLocks noGrp="1"/>
+          </p:cNvSpPr>
+          <p:nvPr>
+            <p:ph type="sldNum" sz="quarter" idx="10"/>
+          </p:nvPr>
+        </p:nvSpPr>
+        <p:spPr/>
+        <p:txBody>
+          <a:bodyPr/>
+          <a:lstStyle/>
+          <a:p>
+            <a:fld id="{53D707A1-1B9C-9244-B89C-5F515C41BB18}" type="slidenum">
+              <a:rPr lang="en-US" smtClean="0"/>
+              <a:t>12</a:t>
+            </a:fld>
+            <a:endParaRPr lang="en-US"/>
+          </a:p>
+        </p:txBody>
+      </p:sp>
+    </p:spTree>
+    <p:extLst>
+      <p:ext uri="{BB962C8B-B14F-4D97-AF65-F5344CB8AC3E}">
+        <p14:creationId xmlns:p14="http://schemas.microsoft.com/office/powerpoint/2010/main" val="1976701453"/>
+      </p:ext>
+    </p:extLst>
+  </p:cSld>
+  <p:clrMapOvr>
+    <a:masterClrMapping/>
+  </p:clrMapOvr>
+</p:notes>
+</file>
+
+<file path=ppt/notesSlides/notesSlide8.xml><?xml version="1.0" encoding="utf-8"?>
+<p:notes xmlns:a="http://schemas.openxmlformats.org/drawingml/2006/main" xmlns:r="http://schemas.openxmlformats.org/officeDocument/2006/relationships" xmlns:p="http://schemas.openxmlformats.org/presentationml/2006/main">
+  <p:cSld>
+    <p:spTree>
+      <p:nvGrpSpPr>
+        <p:cNvPr id="1" name=""/>
+        <p:cNvGrpSpPr/>
+        <p:nvPr/>
+      </p:nvGrpSpPr>
+      <p:grpSpPr>
+        <a:xfrm>
+          <a:off x="0" y="0"/>
+          <a:ext cx="0" cy="0"/>
+          <a:chOff x="0" y="0"/>
+          <a:chExt cx="0" cy="0"/>
+        </a:xfrm>
+      </p:grpSpPr>
+      <p:sp>
+        <p:nvSpPr>
+          <p:cNvPr id="2" name="Slide Image Placeholder 1"/>
+          <p:cNvSpPr>
+            <a:spLocks noGrp="1" noRot="1" noChangeAspect="1"/>
+          </p:cNvSpPr>
+          <p:nvPr>
+            <p:ph type="sldImg"/>
+          </p:nvPr>
+        </p:nvSpPr>
+        <p:spPr/>
+      </p:sp>
+      <p:sp>
+        <p:nvSpPr>
+          <p:cNvPr id="3" name="Notes Placeholder 2"/>
+          <p:cNvSpPr>
+            <a:spLocks noGrp="1"/>
+          </p:cNvSpPr>
+          <p:nvPr>
+            <p:ph type="body" idx="1"/>
+          </p:nvPr>
+        </p:nvSpPr>
+        <p:spPr/>
+        <p:txBody>
+          <a:bodyPr/>
+          <a:lstStyle/>
+          <a:p>
+            <a:r>
+              <a:rPr lang="en-US" dirty="0" smtClean="0"/>
+              <a:t>matt</a:t>
+            </a:r>
+            <a:endParaRPr lang="en-US" dirty="0"/>
+          </a:p>
+        </p:txBody>
+      </p:sp>
+      <p:sp>
+        <p:nvSpPr>
+          <p:cNvPr id="4" name="Slide Number Placeholder 3"/>
+          <p:cNvSpPr>
+            <a:spLocks noGrp="1"/>
+          </p:cNvSpPr>
+          <p:nvPr>
+            <p:ph type="sldNum" sz="quarter" idx="10"/>
+          </p:nvPr>
+        </p:nvSpPr>
+        <p:spPr/>
+        <p:txBody>
+          <a:bodyPr/>
+          <a:lstStyle/>
+          <a:p>
+            <a:fld id="{53D707A1-1B9C-9244-B89C-5F515C41BB18}" type="slidenum">
+              <a:rPr lang="en-US" smtClean="0"/>
+              <a:t>13</a:t>
+            </a:fld>
+            <a:endParaRPr lang="en-US"/>
+          </a:p>
+        </p:txBody>
+      </p:sp>
+    </p:spTree>
+    <p:extLst>
+      <p:ext uri="{BB962C8B-B14F-4D97-AF65-F5344CB8AC3E}">
+        <p14:creationId xmlns:p14="http://schemas.microsoft.com/office/powerpoint/2010/main" val="849301481"/>
+      </p:ext>
+    </p:extLst>
+  </p:cSld>
+  <p:clrMapOvr>
+    <a:masterClrMapping/>
+  </p:clrMapOvr>
+</p:notes>
+</file>
+
+<file path=ppt/notesSlides/notesSlide9.xml><?xml version="1.0" encoding="utf-8"?>
+<p:notes xmlns:a="http://schemas.openxmlformats.org/drawingml/2006/main" xmlns:r="http://schemas.openxmlformats.org/officeDocument/2006/relationships" xmlns:p="http://schemas.openxmlformats.org/presentationml/2006/main">
+  <p:cSld>
+    <p:spTree>
+      <p:nvGrpSpPr>
+        <p:cNvPr id="1" name=""/>
+        <p:cNvGrpSpPr/>
+        <p:nvPr/>
+      </p:nvGrpSpPr>
+      <p:grpSpPr>
+        <a:xfrm>
+          <a:off x="0" y="0"/>
+          <a:ext cx="0" cy="0"/>
+          <a:chOff x="0" y="0"/>
+          <a:chExt cx="0" cy="0"/>
+        </a:xfrm>
+      </p:grpSpPr>
+      <p:sp>
+        <p:nvSpPr>
+          <p:cNvPr id="2" name="Slide Image Placeholder 1"/>
+          <p:cNvSpPr>
+            <a:spLocks noGrp="1" noRot="1" noChangeAspect="1"/>
+          </p:cNvSpPr>
+          <p:nvPr>
+            <p:ph type="sldImg"/>
+          </p:nvPr>
+        </p:nvSpPr>
+        <p:spPr/>
+      </p:sp>
+      <p:sp>
+        <p:nvSpPr>
+          <p:cNvPr id="3" name="Notes Placeholder 2"/>
+          <p:cNvSpPr>
+            <a:spLocks noGrp="1"/>
+          </p:cNvSpPr>
+          <p:nvPr>
+            <p:ph type="body" idx="1"/>
+          </p:nvPr>
+        </p:nvSpPr>
+        <p:spPr/>
+        <p:txBody>
+          <a:bodyPr/>
+          <a:lstStyle/>
+          <a:p>
+            <a:r>
+              <a:rPr lang="en-US" dirty="0" smtClean="0"/>
+              <a:t>me</a:t>
+            </a:r>
+            <a:endParaRPr lang="en-US" dirty="0"/>
+          </a:p>
+        </p:txBody>
+      </p:sp>
+      <p:sp>
+        <p:nvSpPr>
+          <p:cNvPr id="4" name="Slide Number Placeholder 3"/>
+          <p:cNvSpPr>
+            <a:spLocks noGrp="1"/>
+          </p:cNvSpPr>
+          <p:nvPr>
+            <p:ph type="sldNum" sz="quarter" idx="10"/>
+          </p:nvPr>
+        </p:nvSpPr>
+        <p:spPr/>
+        <p:txBody>
+          <a:bodyPr/>
+          <a:lstStyle/>
+          <a:p>
+            <a:fld id="{53D707A1-1B9C-9244-B89C-5F515C41BB18}" type="slidenum">
+              <a:rPr lang="en-US" smtClean="0"/>
+              <a:t>14</a:t>
+            </a:fld>
+            <a:endParaRPr lang="en-US"/>
+          </a:p>
+        </p:txBody>
+      </p:sp>
+    </p:spTree>
+    <p:extLst>
+      <p:ext uri="{BB962C8B-B14F-4D97-AF65-F5344CB8AC3E}">
+        <p14:creationId xmlns:p14="http://schemas.microsoft.com/office/powerpoint/2010/main" val="651612806"/>
       </p:ext>
     </p:extLst>
   </p:cSld>
@@ -944,7 +1757,7 @@
             <a:fld id="{8E36636D-D922-432D-A958-524484B5923D}" type="datetimeFigureOut">
               <a:rPr lang="en-US" dirty="0"/>
               <a:pPr/>
-              <a:t>4/24/16</a:t>
+              <a:t>4/25/16</a:t>
             </a:fld>
             <a:endParaRPr lang="en-US" dirty="0"/>
           </a:p>
@@ -1238,7 +2051,7 @@
           <a:p>
             <a:fld id="{48A87A34-81AB-432B-8DAE-1953F412C126}" type="datetimeFigureOut">
               <a:rPr lang="en-US" dirty="0"/>
-              <a:t>4/24/16</a:t>
+              <a:t>4/25/16</a:t>
             </a:fld>
             <a:endParaRPr lang="en-US" dirty="0"/>
           </a:p>
@@ -1425,7 +2238,7 @@
           <a:p>
             <a:fld id="{48A87A34-81AB-432B-8DAE-1953F412C126}" type="datetimeFigureOut">
               <a:rPr lang="en-US" dirty="0"/>
-              <a:t>4/24/16</a:t>
+              <a:t>4/25/16</a:t>
             </a:fld>
             <a:endParaRPr lang="en-US" dirty="0"/>
           </a:p>
@@ -1681,7 +2494,7 @@
           <a:p>
             <a:fld id="{48A87A34-81AB-432B-8DAE-1953F412C126}" type="datetimeFigureOut">
               <a:rPr lang="en-US" dirty="0"/>
-              <a:t>4/24/16</a:t>
+              <a:t>4/25/16</a:t>
             </a:fld>
             <a:endParaRPr lang="en-US" dirty="0"/>
           </a:p>
@@ -2100,7 +2913,7 @@
           <a:p>
             <a:fld id="{48A87A34-81AB-432B-8DAE-1953F412C126}" type="datetimeFigureOut">
               <a:rPr lang="en-US" dirty="0"/>
-              <a:t>4/24/16</a:t>
+              <a:t>4/25/16</a:t>
             </a:fld>
             <a:endParaRPr lang="en-US" dirty="0"/>
           </a:p>
@@ -2632,7 +3445,7 @@
           <a:p>
             <a:fld id="{48A87A34-81AB-432B-8DAE-1953F412C126}" type="datetimeFigureOut">
               <a:rPr lang="en-US" dirty="0"/>
-              <a:t>4/24/16</a:t>
+              <a:t>4/25/16</a:t>
             </a:fld>
             <a:endParaRPr lang="en-US" dirty="0"/>
           </a:p>
@@ -3491,7 +4304,7 @@
           <a:p>
             <a:fld id="{48A87A34-81AB-432B-8DAE-1953F412C126}" type="datetimeFigureOut">
               <a:rPr lang="en-US" dirty="0"/>
-              <a:t>4/24/16</a:t>
+              <a:t>4/25/16</a:t>
             </a:fld>
             <a:endParaRPr lang="en-US" dirty="0"/>
           </a:p>
@@ -3657,7 +4470,7 @@
             <a:fld id="{8E36636D-D922-432D-A958-524484B5923D}" type="datetimeFigureOut">
               <a:rPr lang="en-US" dirty="0"/>
               <a:pPr/>
-              <a:t>4/24/16</a:t>
+              <a:t>4/25/16</a:t>
             </a:fld>
             <a:endParaRPr lang="en-US" dirty="0"/>
           </a:p>
@@ -3838,7 +4651,7 @@
             <a:fld id="{8E36636D-D922-432D-A958-524484B5923D}" type="datetimeFigureOut">
               <a:rPr lang="en-US" dirty="0"/>
               <a:pPr/>
-              <a:t>4/24/16</a:t>
+              <a:t>4/25/16</a:t>
             </a:fld>
             <a:endParaRPr lang="en-US" dirty="0"/>
           </a:p>
@@ -4005,7 +4818,7 @@
             <a:fld id="{8E36636D-D922-432D-A958-524484B5923D}" type="datetimeFigureOut">
               <a:rPr lang="en-US" dirty="0"/>
               <a:pPr/>
-              <a:t>4/24/16</a:t>
+              <a:t>4/25/16</a:t>
             </a:fld>
             <a:endParaRPr lang="en-US" dirty="0"/>
           </a:p>
@@ -4246,7 +5059,7 @@
             <a:fld id="{8E36636D-D922-432D-A958-524484B5923D}" type="datetimeFigureOut">
               <a:rPr lang="en-US" dirty="0"/>
               <a:pPr/>
-              <a:t>4/24/16</a:t>
+              <a:t>4/25/16</a:t>
             </a:fld>
             <a:endParaRPr lang="en-US" dirty="0"/>
           </a:p>
@@ -4479,7 +5292,7 @@
             <a:fld id="{8E36636D-D922-432D-A958-524484B5923D}" type="datetimeFigureOut">
               <a:rPr lang="en-US" dirty="0"/>
               <a:pPr/>
-              <a:t>4/24/16</a:t>
+              <a:t>4/25/16</a:t>
             </a:fld>
             <a:endParaRPr lang="en-US" dirty="0"/>
           </a:p>
@@ -4942,7 +5755,7 @@
             <a:fld id="{8E36636D-D922-432D-A958-524484B5923D}" type="datetimeFigureOut">
               <a:rPr lang="en-US" dirty="0"/>
               <a:pPr/>
-              <a:t>4/24/16</a:t>
+              <a:t>4/25/16</a:t>
             </a:fld>
             <a:endParaRPr lang="en-US" dirty="0"/>
           </a:p>
@@ -5057,7 +5870,7 @@
             <a:fld id="{8E36636D-D922-432D-A958-524484B5923D}" type="datetimeFigureOut">
               <a:rPr lang="en-US" dirty="0"/>
               <a:pPr/>
-              <a:t>4/24/16</a:t>
+              <a:t>4/25/16</a:t>
             </a:fld>
             <a:endParaRPr lang="en-US" dirty="0"/>
           </a:p>
@@ -5149,7 +5962,7 @@
             <a:fld id="{8E36636D-D922-432D-A958-524484B5923D}" type="datetimeFigureOut">
               <a:rPr lang="en-US" dirty="0"/>
               <a:pPr/>
-              <a:t>4/24/16</a:t>
+              <a:t>4/25/16</a:t>
             </a:fld>
             <a:endParaRPr lang="en-US" dirty="0"/>
           </a:p>
@@ -5401,7 +6214,7 @@
             <a:fld id="{8E36636D-D922-432D-A958-524484B5923D}" type="datetimeFigureOut">
               <a:rPr lang="en-US" dirty="0"/>
               <a:pPr/>
-              <a:t>4/24/16</a:t>
+              <a:t>4/25/16</a:t>
             </a:fld>
             <a:endParaRPr lang="en-US" dirty="0"/>
           </a:p>
@@ -5698,7 +6511,7 @@
             <a:fld id="{8E36636D-D922-432D-A958-524484B5923D}" type="datetimeFigureOut">
               <a:rPr lang="en-US" dirty="0"/>
               <a:pPr/>
-              <a:t>4/24/16</a:t>
+              <a:t>4/25/16</a:t>
             </a:fld>
             <a:endParaRPr lang="en-US" dirty="0"/>
           </a:p>
@@ -5929,7 +6742,7 @@
             <a:fld id="{8E36636D-D922-432D-A958-524484B5923D}" type="datetimeFigureOut">
               <a:rPr lang="en-US" dirty="0"/>
               <a:pPr/>
-              <a:t>4/24/16</a:t>
+              <a:t>4/25/16</a:t>
             </a:fld>
             <a:endParaRPr lang="en-US" dirty="0"/>
           </a:p>
@@ -6707,7 +7520,7 @@
           <p:nvPr/>
         </p:nvPicPr>
         <p:blipFill>
-          <a:blip r:embed="rId2">
+          <a:blip r:embed="rId3">
             <a:extLst>
               <a:ext uri="{28A0092B-C50C-407E-A947-70E740481C1C}">
                 <a14:useLocalDpi xmlns:a14="http://schemas.microsoft.com/office/drawing/2010/main" val="0"/>
@@ -6792,7 +7605,7 @@
           </p:nvPr>
         </p:nvPicPr>
         <p:blipFill>
-          <a:blip r:embed="rId2">
+          <a:blip r:embed="rId3">
             <a:extLst>
               <a:ext uri="{28A0092B-C50C-407E-A947-70E740481C1C}">
                 <a14:useLocalDpi xmlns:a14="http://schemas.microsoft.com/office/drawing/2010/main" val="0"/>
@@ -6901,7 +7714,7 @@
           <p:nvPr/>
         </p:nvPicPr>
         <p:blipFill>
-          <a:blip r:embed="rId2">
+          <a:blip r:embed="rId3">
             <a:extLst>
               <a:ext uri="{28A0092B-C50C-407E-A947-70E740481C1C}">
                 <a14:useLocalDpi xmlns:a14="http://schemas.microsoft.com/office/drawing/2010/main" val="0"/>
@@ -6931,7 +7744,7 @@
           <p:nvPr/>
         </p:nvPicPr>
         <p:blipFill>
-          <a:blip r:embed="rId3">
+          <a:blip r:embed="rId4">
             <a:extLst>
               <a:ext uri="{28A0092B-C50C-407E-A947-70E740481C1C}">
                 <a14:useLocalDpi xmlns:a14="http://schemas.microsoft.com/office/drawing/2010/main" val="0"/>
@@ -7067,11 +7880,7 @@
             </a:pPr>
             <a:r>
               <a:rPr lang="en-US" dirty="0" smtClean="0"/>
-              <a:t>Used for </a:t>
-            </a:r>
-            <a:r>
-              <a:rPr lang="en-US" dirty="0" smtClean="0"/>
-              <a:t>selecting optimal neural network configurations for testing</a:t>
+              <a:t>Used for selecting optimal neural network configurations for testing</a:t>
             </a:r>
           </a:p>
           <a:p>
@@ -7136,7 +7945,7 @@
           <p:nvPr/>
         </p:nvPicPr>
         <p:blipFill rotWithShape="1">
-          <a:blip r:embed="rId2">
+          <a:blip r:embed="rId3">
             <a:extLst>
               <a:ext uri="{28A0092B-C50C-407E-A947-70E740481C1C}">
                 <a14:useLocalDpi xmlns:a14="http://schemas.microsoft.com/office/drawing/2010/main" val="0"/>
@@ -7220,7 +8029,7 @@
           </p:nvPr>
         </p:nvPicPr>
         <p:blipFill>
-          <a:blip r:embed="rId2">
+          <a:blip r:embed="rId3">
             <a:extLst>
               <a:ext uri="{28A0092B-C50C-407E-A947-70E740481C1C}">
                 <a14:useLocalDpi xmlns:a14="http://schemas.microsoft.com/office/drawing/2010/main" val="0"/>
@@ -7319,7 +8128,7 @@
           <p:nvPr/>
         </p:nvPicPr>
         <p:blipFill>
-          <a:blip r:embed="rId2">
+          <a:blip r:embed="rId3">
             <a:extLst>
               <a:ext uri="{28A0092B-C50C-407E-A947-70E740481C1C}">
                 <a14:useLocalDpi xmlns:a14="http://schemas.microsoft.com/office/drawing/2010/main" val="0"/>
@@ -7450,15 +8259,28 @@
             </a:r>
             <a:r>
               <a:rPr lang="is-IS" dirty="0" smtClean="0"/>
-              <a:t>ests show our neural network approach is feasible but </a:t>
-            </a:r>
-            <a:r>
-              <a:rPr lang="is-IS" smtClean="0"/>
-              <a:t>could likely be </a:t>
-            </a:r>
-            <a:r>
-              <a:rPr lang="is-IS" dirty="0" smtClean="0"/>
-              <a:t>improved by</a:t>
+              <a:t>ests show our neural network approach is feasible but could likely be improved by</a:t>
+            </a:r>
+          </a:p>
+          <a:p>
+            <a:pPr marL="1025525" lvl="2" indent="-215900">
+              <a:buFont typeface="Arial" charset="0"/>
+              <a:buChar char="•"/>
+              <a:tabLst>
+                <a:tab pos="8910638" algn="l"/>
+              </a:tabLst>
+            </a:pPr>
+            <a:r>
+              <a:rPr lang="en-US" dirty="0" smtClean="0"/>
+              <a:t>discovering and extracting </a:t>
+            </a:r>
+            <a:r>
+              <a:rPr lang="en-US" dirty="0"/>
+              <a:t>more meaningful </a:t>
+            </a:r>
+            <a:r>
+              <a:rPr lang="en-US" dirty="0" smtClean="0"/>
+              <a:t>features</a:t>
             </a:r>
           </a:p>
           <a:p>
@@ -7468,15 +8290,15 @@
             </a:pPr>
             <a:r>
               <a:rPr lang="en-US" dirty="0" smtClean="0"/>
-              <a:t>discovering and extracting </a:t>
+              <a:t>testing </a:t>
             </a:r>
             <a:r>
               <a:rPr lang="en-US" dirty="0"/>
-              <a:t>more meaningful </a:t>
+              <a:t>the feasibility of different neural network </a:t>
             </a:r>
             <a:r>
               <a:rPr lang="en-US" dirty="0" smtClean="0"/>
-              <a:t>features</a:t>
+              <a:t>configurations</a:t>
             </a:r>
           </a:p>
           <a:p>
@@ -7486,31 +8308,12 @@
             </a:pPr>
             <a:r>
               <a:rPr lang="en-US" dirty="0" smtClean="0"/>
-              <a:t>testing </a:t>
-            </a:r>
-            <a:r>
-              <a:rPr lang="en-US" dirty="0"/>
-              <a:t>the feasibility of different neural network </a:t>
-            </a:r>
-            <a:r>
-              <a:rPr lang="en-US" dirty="0" smtClean="0"/>
-              <a:t>configurations</a:t>
-            </a:r>
-          </a:p>
-          <a:p>
-            <a:pPr lvl="2">
-              <a:buFont typeface="Arial" charset="0"/>
-              <a:buChar char="•"/>
-            </a:pPr>
-            <a:r>
-              <a:rPr lang="en-US" dirty="0" smtClean="0"/>
               <a:t>investigating </a:t>
             </a:r>
             <a:r>
               <a:rPr lang="en-US" dirty="0"/>
               <a:t>the significance of corpus size. </a:t>
             </a:r>
-            <a:endParaRPr lang="en-US" dirty="0"/>
           </a:p>
         </p:txBody>
       </p:sp>
@@ -7892,24 +8695,7 @@
                   <a:srgbClr val="DADADA"/>
                 </a:solidFill>
               </a:rPr>
-              <a:t>Identifying </a:t>
-            </a:r>
-            <a:r>
-              <a:rPr lang="en-US" sz="2000" dirty="0" smtClean="0">
-                <a:ln>
-                  <a:solidFill>
-                    <a:prstClr val="black">
-                      <a:lumMod val="75000"/>
-                      <a:lumOff val="25000"/>
-                      <a:alpha val="10000"/>
-                    </a:prstClr>
-                  </a:solidFill>
-                </a:ln>
-                <a:solidFill>
-                  <a:srgbClr val="DADADA"/>
-                </a:solidFill>
-              </a:rPr>
-              <a:t>Individuals in cyber bullying</a:t>
+              <a:t>Identifying Individuals in cyber bullying</a:t>
             </a:r>
           </a:p>
           <a:p>
@@ -9428,11 +10214,7 @@
           <a:p>
             <a:r>
               <a:rPr lang="en-US" dirty="0" smtClean="0"/>
-              <a:t>Data </a:t>
-            </a:r>
-            <a:r>
-              <a:rPr lang="en-US" dirty="0" smtClean="0"/>
-              <a:t>Collection*</a:t>
+              <a:t>Data Collection*</a:t>
             </a:r>
             <a:endParaRPr lang="en-US" dirty="0"/>
           </a:p>
@@ -9884,7 +10666,6 @@
               <a:rPr lang="en-US" dirty="0"/>
               <a:t>Edith  Wharton</a:t>
             </a:r>
-            <a:endParaRPr lang="en-US" dirty="0"/>
           </a:p>
         </p:txBody>
       </p:sp>
@@ -10211,6 +10992,63 @@
           </a:p>
         </p:txBody>
       </p:sp>
+      <p:sp>
+        <p:nvSpPr>
+          <p:cNvPr id="4" name="TextBox 3"/>
+          <p:cNvSpPr txBox="1"/>
+          <p:nvPr/>
+        </p:nvSpPr>
+        <p:spPr>
+          <a:xfrm>
+            <a:off x="7158037" y="2643187"/>
+            <a:ext cx="3857625" cy="923330"/>
+          </a:xfrm>
+          <a:prstGeom prst="rect">
+            <a:avLst/>
+          </a:prstGeom>
+          <a:noFill/>
+        </p:spPr>
+        <p:txBody>
+          <a:bodyPr wrap="square" rtlCol="0">
+            <a:spAutoFit/>
+          </a:bodyPr>
+          <a:lstStyle/>
+          <a:p>
+            <a:r>
+              <a:rPr lang="en-US" dirty="0" smtClean="0">
+                <a:solidFill>
+                  <a:schemeClr val="tx2">
+                    <a:lumMod val="90000"/>
+                  </a:schemeClr>
+                </a:solidFill>
+              </a:rPr>
+              <a:t>“There are books of which the backs and covers are by far the best parts.” </a:t>
+            </a:r>
+          </a:p>
+          <a:p>
+            <a:r>
+              <a:rPr lang="en-US" dirty="0" smtClean="0">
+                <a:solidFill>
+                  <a:schemeClr val="tx2">
+                    <a:lumMod val="90000"/>
+                  </a:schemeClr>
+                </a:solidFill>
+              </a:rPr>
+              <a:t>― </a:t>
+            </a:r>
+            <a:r>
+              <a:rPr lang="en-US" dirty="0">
+                <a:solidFill>
+                  <a:schemeClr val="tx2">
+                    <a:lumMod val="90000"/>
+                  </a:schemeClr>
+                </a:solidFill>
+              </a:rPr>
+              <a:t>Charles Dickens, Oliver Twist</a:t>
+            </a:r>
+          </a:p>
+        </p:txBody>
+      </p:sp>
     </p:spTree>
     <p:extLst>
       <p:ext uri="{BB962C8B-B14F-4D97-AF65-F5344CB8AC3E}">
@@ -10287,15 +11125,7 @@
             </a:pPr>
             <a:r>
               <a:rPr lang="en-US" dirty="0" smtClean="0"/>
-              <a:t>average  </a:t>
-            </a:r>
-            <a:r>
-              <a:rPr lang="en-US" dirty="0"/>
-              <a:t>word  </a:t>
-            </a:r>
-            <a:r>
-              <a:rPr lang="en-US" dirty="0" smtClean="0"/>
-              <a:t>length</a:t>
+              <a:t>average word length</a:t>
             </a:r>
           </a:p>
           <a:p>
@@ -10305,15 +11135,7 @@
             </a:pPr>
             <a:r>
               <a:rPr lang="en-US" dirty="0" smtClean="0"/>
-              <a:t>average  </a:t>
-            </a:r>
-            <a:r>
-              <a:rPr lang="en-US" dirty="0"/>
-              <a:t>sentence  </a:t>
-            </a:r>
-            <a:r>
-              <a:rPr lang="en-US" dirty="0" smtClean="0"/>
-              <a:t>length</a:t>
+              <a:t>average sentence length</a:t>
             </a:r>
           </a:p>
           <a:p>
@@ -10323,15 +11145,7 @@
             </a:pPr>
             <a:r>
               <a:rPr lang="en-US" dirty="0" smtClean="0"/>
-              <a:t>most  </a:t>
-            </a:r>
-            <a:r>
-              <a:rPr lang="en-US" dirty="0"/>
-              <a:t>unique  </a:t>
-            </a:r>
-            <a:r>
-              <a:rPr lang="en-US" dirty="0" smtClean="0"/>
-              <a:t>words</a:t>
+              <a:t>most unique words</a:t>
             </a:r>
           </a:p>
           <a:p>
@@ -10345,7 +11159,7 @@
             </a:r>
             <a:r>
               <a:rPr lang="en-US" dirty="0"/>
-              <a:t>common  </a:t>
+              <a:t>common </a:t>
             </a:r>
             <a:r>
               <a:rPr lang="en-US" dirty="0" smtClean="0"/>
@@ -10363,11 +11177,11 @@
             </a:r>
             <a:r>
               <a:rPr lang="en-US" dirty="0"/>
-              <a:t>common  first  </a:t>
+              <a:t>common  </a:t>
             </a:r>
             <a:r>
               <a:rPr lang="en-US" dirty="0" smtClean="0"/>
-              <a:t>word</a:t>
+              <a:t>first word</a:t>
             </a:r>
           </a:p>
           <a:p>
@@ -10483,7 +11297,6 @@
               <a:rPr lang="en-US" dirty="0"/>
               <a:t>Feature Selection</a:t>
             </a:r>
-            <a:endParaRPr lang="en-US" dirty="0"/>
           </a:p>
         </p:txBody>
       </p:sp>
@@ -10766,27 +11579,6 @@
               </a:rPr>
               <a:t>character  and  word  n-grams  of  various  lengths</a:t>
             </a:r>
-            <a:endParaRPr lang="en-US" dirty="0">
-              <a:ln>
-                <a:solidFill>
-                  <a:prstClr val="black">
-                    <a:lumMod val="75000"/>
-                    <a:lumOff val="25000"/>
-                    <a:alpha val="10000"/>
-                  </a:prstClr>
-                </a:solidFill>
-              </a:ln>
-              <a:solidFill>
-                <a:srgbClr val="DADADA"/>
-              </a:solidFill>
-              <a:effectLst>
-                <a:outerShdw blurRad="9525" dist="25400" dir="14640000" algn="tl" rotWithShape="0">
-                  <a:prstClr val="black">
-                    <a:alpha val="30000"/>
-                  </a:prstClr>
-                </a:outerShdw>
-              </a:effectLst>
-            </a:endParaRPr>
           </a:p>
         </p:txBody>
       </p:sp>
@@ -10845,7 +11637,7 @@
           <p:nvPr/>
         </p:nvPicPr>
         <p:blipFill rotWithShape="1">
-          <a:blip r:embed="rId2">
+          <a:blip r:embed="rId3">
             <a:extLst>
               <a:ext uri="{28A0092B-C50C-407E-A947-70E740481C1C}">
                 <a14:useLocalDpi xmlns:a14="http://schemas.microsoft.com/office/drawing/2010/main" val="0"/>
@@ -10874,7 +11666,7 @@
           <p:nvPr/>
         </p:nvPicPr>
         <p:blipFill rotWithShape="1">
-          <a:blip r:embed="rId3">
+          <a:blip r:embed="rId4">
             <a:extLst>
               <a:ext uri="{28A0092B-C50C-407E-A947-70E740481C1C}">
                 <a14:useLocalDpi xmlns:a14="http://schemas.microsoft.com/office/drawing/2010/main" val="0"/>

</xml_diff>

<commit_message>
small updates to presentation
</commit_message>
<xml_diff>
--- a/ai_project_presentation.pptx
+++ b/ai_project_presentation.pptx
@@ -8100,25 +8100,6 @@
           </a:p>
         </p:txBody>
       </p:sp>
-      <p:sp>
-        <p:nvSpPr>
-          <p:cNvPr id="3" name="Content Placeholder 2"/>
-          <p:cNvSpPr>
-            <a:spLocks noGrp="1"/>
-          </p:cNvSpPr>
-          <p:nvPr>
-            <p:ph idx="1"/>
-          </p:nvPr>
-        </p:nvSpPr>
-        <p:spPr/>
-        <p:txBody>
-          <a:bodyPr/>
-          <a:lstStyle/>
-          <a:p>
-            <a:endParaRPr lang="en-US" dirty="0"/>
-          </a:p>
-        </p:txBody>
-      </p:sp>
       <p:pic>
         <p:nvPicPr>
           <p:cNvPr id="5" name="Picture 4"/>
@@ -10243,13 +10224,8 @@
             </a:pPr>
             <a:r>
               <a:rPr lang="en-US" sz="2600" dirty="0" smtClean="0"/>
-              <a:t>Victorian Era </a:t>
-            </a:r>
-            <a:r>
-              <a:rPr lang="en-US" sz="2600" dirty="0" smtClean="0"/>
-              <a:t>works (~84 MB of plain text)</a:t>
-            </a:r>
-            <a:endParaRPr lang="en-US" sz="2600" dirty="0" smtClean="0"/>
+              <a:t>Victorian Era works (~84 MB of plain text)</a:t>
+            </a:r>
           </a:p>
           <a:p>
             <a:pPr>
@@ -10258,13 +10234,8 @@
             </a:pPr>
             <a:r>
               <a:rPr lang="en-US" sz="2600" dirty="0" smtClean="0"/>
-              <a:t>Over 100 works written by 12 different </a:t>
-            </a:r>
-            <a:r>
-              <a:rPr lang="en-US" sz="2600" dirty="0" smtClean="0"/>
-              <a:t>authors</a:t>
-            </a:r>
-            <a:endParaRPr lang="en-US" sz="2600" dirty="0" smtClean="0"/>
+              <a:t>Over 100 works written by 12 different authors</a:t>
+            </a:r>
           </a:p>
           <a:p>
             <a:pPr>
@@ -10275,7 +10246,6 @@
               <a:rPr lang="en-US" sz="2600" dirty="0" smtClean="0"/>
               <a:t>Individual vs. Combined</a:t>
             </a:r>
-            <a:endParaRPr lang="en-US" sz="2600" dirty="0" smtClean="0"/>
           </a:p>
           <a:p>
             <a:pPr>
@@ -10859,7 +10829,7 @@
         </p:blipFill>
         <p:spPr>
           <a:xfrm>
-            <a:off x="8107855" y="782583"/>
+            <a:off x="8107855" y="609600"/>
             <a:ext cx="3595164" cy="5702300"/>
           </a:xfrm>
           <a:prstGeom prst="rect">
@@ -10967,15 +10937,7 @@
             </a:pPr>
             <a:r>
               <a:rPr lang="en-US" dirty="0" smtClean="0"/>
-              <a:t>Much b</a:t>
-            </a:r>
-            <a:r>
-              <a:rPr lang="en-US" dirty="0" smtClean="0"/>
-              <a:t>etter </a:t>
-            </a:r>
-            <a:r>
-              <a:rPr lang="en-US" dirty="0" smtClean="0"/>
-              <a:t>than random</a:t>
+              <a:t>Much better than random</a:t>
             </a:r>
           </a:p>
           <a:p>
@@ -10995,15 +10957,7 @@
             </a:pPr>
             <a:r>
               <a:rPr lang="en-US" dirty="0" smtClean="0"/>
-              <a:t>Better </a:t>
-            </a:r>
-            <a:r>
-              <a:rPr lang="en-US" dirty="0" smtClean="0"/>
-              <a:t>than </a:t>
-            </a:r>
-            <a:r>
-              <a:rPr lang="en-US" dirty="0" smtClean="0"/>
-              <a:t>random</a:t>
+              <a:t>Better than random</a:t>
             </a:r>
           </a:p>
           <a:p>
@@ -11293,7 +11247,7 @@
         </p:nvSpPr>
         <p:spPr>
           <a:xfrm>
-            <a:off x="7727624" y="5136669"/>
+            <a:off x="8027662" y="5212868"/>
             <a:ext cx="1966701" cy="369332"/>
           </a:xfrm>
           <a:prstGeom prst="rect">
@@ -11337,7 +11291,7 @@
         </p:blipFill>
         <p:spPr>
           <a:xfrm>
-            <a:off x="7592150" y="1580050"/>
+            <a:off x="7892188" y="1732449"/>
             <a:ext cx="2237651" cy="3271420"/>
           </a:xfrm>
           <a:prstGeom prst="rect">

</xml_diff>